<commit_message>
Last Update 24-09-2018 14:21:25.02
</commit_message>
<xml_diff>
--- a/Slides/Unit 1/GE8151-U1-5.1-Flow-Charts.pptx
+++ b/Slides/Unit 1/GE8151-U1-5.1-Flow-Charts.pptx
@@ -18,7 +18,8 @@
     <p:sldId id="267" r:id="rId12"/>
     <p:sldId id="273" r:id="rId13"/>
     <p:sldId id="272" r:id="rId14"/>
-    <p:sldId id="279" r:id="rId15"/>
+    <p:sldId id="280" r:id="rId15"/>
+    <p:sldId id="279" r:id="rId16"/>
   </p:sldIdLst>
   <p:sldSz cx="6858000" cy="9906000" type="A4"/>
   <p:notesSz cx="6858000" cy="9144000"/>
@@ -302,7 +303,7 @@
             <a:fld id="{A9953F39-409C-4934-84CB-8EF94422C604}" type="datetimeFigureOut">
               <a:rPr lang="en-US" smtClean="0"/>
               <a:pPr/>
-              <a:t>9/19/2018</a:t>
+              <a:t>9/24/2018</a:t>
             </a:fld>
             <a:endParaRPr lang="en-US"/>
           </a:p>
@@ -469,7 +470,7 @@
             <a:fld id="{A9953F39-409C-4934-84CB-8EF94422C604}" type="datetimeFigureOut">
               <a:rPr lang="en-US" smtClean="0"/>
               <a:pPr/>
-              <a:t>9/19/2018</a:t>
+              <a:t>9/24/2018</a:t>
             </a:fld>
             <a:endParaRPr lang="en-US"/>
           </a:p>
@@ -646,7 +647,7 @@
             <a:fld id="{A9953F39-409C-4934-84CB-8EF94422C604}" type="datetimeFigureOut">
               <a:rPr lang="en-US" smtClean="0"/>
               <a:pPr/>
-              <a:t>9/19/2018</a:t>
+              <a:t>9/24/2018</a:t>
             </a:fld>
             <a:endParaRPr lang="en-US"/>
           </a:p>
@@ -813,7 +814,7 @@
             <a:fld id="{A9953F39-409C-4934-84CB-8EF94422C604}" type="datetimeFigureOut">
               <a:rPr lang="en-US" smtClean="0"/>
               <a:pPr/>
-              <a:t>9/19/2018</a:t>
+              <a:t>9/24/2018</a:t>
             </a:fld>
             <a:endParaRPr lang="en-US"/>
           </a:p>
@@ -1056,7 +1057,7 @@
             <a:fld id="{A9953F39-409C-4934-84CB-8EF94422C604}" type="datetimeFigureOut">
               <a:rPr lang="en-US" smtClean="0"/>
               <a:pPr/>
-              <a:t>9/19/2018</a:t>
+              <a:t>9/24/2018</a:t>
             </a:fld>
             <a:endParaRPr lang="en-US"/>
           </a:p>
@@ -1341,7 +1342,7 @@
             <a:fld id="{A9953F39-409C-4934-84CB-8EF94422C604}" type="datetimeFigureOut">
               <a:rPr lang="en-US" smtClean="0"/>
               <a:pPr/>
-              <a:t>9/19/2018</a:t>
+              <a:t>9/24/2018</a:t>
             </a:fld>
             <a:endParaRPr lang="en-US"/>
           </a:p>
@@ -1760,7 +1761,7 @@
             <a:fld id="{A9953F39-409C-4934-84CB-8EF94422C604}" type="datetimeFigureOut">
               <a:rPr lang="en-US" smtClean="0"/>
               <a:pPr/>
-              <a:t>9/19/2018</a:t>
+              <a:t>9/24/2018</a:t>
             </a:fld>
             <a:endParaRPr lang="en-US"/>
           </a:p>
@@ -1875,7 +1876,7 @@
             <a:fld id="{A9953F39-409C-4934-84CB-8EF94422C604}" type="datetimeFigureOut">
               <a:rPr lang="en-US" smtClean="0"/>
               <a:pPr/>
-              <a:t>9/19/2018</a:t>
+              <a:t>9/24/2018</a:t>
             </a:fld>
             <a:endParaRPr lang="en-US"/>
           </a:p>
@@ -1967,7 +1968,7 @@
             <a:fld id="{A9953F39-409C-4934-84CB-8EF94422C604}" type="datetimeFigureOut">
               <a:rPr lang="en-US" smtClean="0"/>
               <a:pPr/>
-              <a:t>9/19/2018</a:t>
+              <a:t>9/24/2018</a:t>
             </a:fld>
             <a:endParaRPr lang="en-US"/>
           </a:p>
@@ -2241,7 +2242,7 @@
             <a:fld id="{A9953F39-409C-4934-84CB-8EF94422C604}" type="datetimeFigureOut">
               <a:rPr lang="en-US" smtClean="0"/>
               <a:pPr/>
-              <a:t>9/19/2018</a:t>
+              <a:t>9/24/2018</a:t>
             </a:fld>
             <a:endParaRPr lang="en-US"/>
           </a:p>
@@ -2491,7 +2492,7 @@
             <a:fld id="{A9953F39-409C-4934-84CB-8EF94422C604}" type="datetimeFigureOut">
               <a:rPr lang="en-US" smtClean="0"/>
               <a:pPr/>
-              <a:t>9/19/2018</a:t>
+              <a:t>9/24/2018</a:t>
             </a:fld>
             <a:endParaRPr lang="en-US"/>
           </a:p>
@@ -2701,7 +2702,7 @@
             <a:fld id="{A9953F39-409C-4934-84CB-8EF94422C604}" type="datetimeFigureOut">
               <a:rPr lang="en-US" smtClean="0"/>
               <a:pPr/>
-              <a:t>9/19/2018</a:t>
+              <a:t>9/24/2018</a:t>
             </a:fld>
             <a:endParaRPr lang="en-US"/>
           </a:p>
@@ -6402,13 +6403,8 @@
             <a:pPr algn="ctr"/>
             <a:r>
               <a:rPr lang="en-US" dirty="0" smtClean="0"/>
-              <a:t>Tower of </a:t>
-            </a:r>
-            <a:r>
-              <a:rPr lang="en-US" dirty="0" smtClean="0"/>
-              <a:t>Hanoi</a:t>
-            </a:r>
-            <a:endParaRPr lang="en-US" dirty="0" smtClean="0"/>
+              <a:t>Tower of Hanoi</a:t>
+            </a:r>
           </a:p>
         </p:txBody>
       </p:sp>
@@ -7412,13 +7408,8 @@
             <a:pPr algn="ctr"/>
             <a:r>
               <a:rPr lang="en-US" dirty="0" smtClean="0"/>
-              <a:t>Tower of </a:t>
-            </a:r>
-            <a:r>
-              <a:rPr lang="en-US" dirty="0" smtClean="0"/>
-              <a:t>Hanoi</a:t>
-            </a:r>
-            <a:endParaRPr lang="en-US" dirty="0" smtClean="0"/>
+              <a:t>Tower of Hanoi</a:t>
+            </a:r>
           </a:p>
         </p:txBody>
       </p:sp>
@@ -7431,6 +7422,637 @@
 </file>
 
 <file path=ppt/slides/slide14.xml><?xml version="1.0" encoding="utf-8"?>
+<p:sld xmlns:a="http://schemas.openxmlformats.org/drawingml/2006/main" xmlns:r="http://schemas.openxmlformats.org/officeDocument/2006/relationships" xmlns:p="http://schemas.openxmlformats.org/presentationml/2006/main">
+  <p:cSld>
+    <p:spTree>
+      <p:nvGrpSpPr>
+        <p:cNvPr id="1" name=""/>
+        <p:cNvGrpSpPr/>
+        <p:nvPr/>
+      </p:nvGrpSpPr>
+      <p:grpSpPr>
+        <a:xfrm>
+          <a:off x="0" y="0"/>
+          <a:ext cx="0" cy="0"/>
+          <a:chOff x="0" y="0"/>
+          <a:chExt cx="0" cy="0"/>
+        </a:xfrm>
+      </p:grpSpPr>
+      <p:grpSp>
+        <p:nvGrpSpPr>
+          <p:cNvPr id="2" name="Group 118"/>
+          <p:cNvGrpSpPr/>
+          <p:nvPr/>
+        </p:nvGrpSpPr>
+        <p:grpSpPr>
+          <a:xfrm>
+            <a:off x="1888110" y="809596"/>
+            <a:ext cx="4411110" cy="4714908"/>
+            <a:chOff x="1888110" y="809596"/>
+            <a:chExt cx="4411110" cy="4714908"/>
+          </a:xfrm>
+        </p:grpSpPr>
+        <p:sp>
+          <p:nvSpPr>
+            <p:cNvPr id="3" name="Oval 2"/>
+            <p:cNvSpPr/>
+            <p:nvPr/>
+          </p:nvSpPr>
+          <p:spPr>
+            <a:xfrm>
+              <a:off x="2292652" y="809596"/>
+              <a:ext cx="1303334" cy="500066"/>
+            </a:xfrm>
+            <a:prstGeom prst="ellipse">
+              <a:avLst/>
+            </a:prstGeom>
+          </p:spPr>
+          <p:style>
+            <a:lnRef idx="2">
+              <a:schemeClr val="dk1"/>
+            </a:lnRef>
+            <a:fillRef idx="1">
+              <a:schemeClr val="lt1"/>
+            </a:fillRef>
+            <a:effectRef idx="0">
+              <a:schemeClr val="dk1"/>
+            </a:effectRef>
+            <a:fontRef idx="minor">
+              <a:schemeClr val="dk1"/>
+            </a:fontRef>
+          </p:style>
+          <p:txBody>
+            <a:bodyPr wrap="none" rtlCol="0" anchor="ctr"/>
+            <a:lstStyle/>
+            <a:p>
+              <a:pPr algn="ctr"/>
+              <a:r>
+                <a:rPr lang="en-IN" dirty="0" smtClean="0"/>
+                <a:t>start</a:t>
+              </a:r>
+              <a:endParaRPr lang="en-US" dirty="0"/>
+            </a:p>
+          </p:txBody>
+        </p:sp>
+        <p:sp>
+          <p:nvSpPr>
+            <p:cNvPr id="4" name="Flowchart: Data 3"/>
+            <p:cNvSpPr/>
+            <p:nvPr/>
+          </p:nvSpPr>
+          <p:spPr>
+            <a:xfrm>
+              <a:off x="1888110" y="1648992"/>
+              <a:ext cx="2112418" cy="500066"/>
+            </a:xfrm>
+            <a:prstGeom prst="flowChartInputOutput">
+              <a:avLst/>
+            </a:prstGeom>
+          </p:spPr>
+          <p:style>
+            <a:lnRef idx="2">
+              <a:schemeClr val="dk1"/>
+            </a:lnRef>
+            <a:fillRef idx="1">
+              <a:schemeClr val="lt1"/>
+            </a:fillRef>
+            <a:effectRef idx="0">
+              <a:schemeClr val="dk1"/>
+            </a:effectRef>
+            <a:fontRef idx="minor">
+              <a:schemeClr val="dk1"/>
+            </a:fontRef>
+          </p:style>
+          <p:txBody>
+            <a:bodyPr wrap="none" rtlCol="0" anchor="ctr"/>
+            <a:lstStyle/>
+            <a:p>
+              <a:pPr algn="ctr"/>
+              <a:r>
+                <a:rPr lang="en-IN" dirty="0" smtClean="0"/>
+                <a:t>read  </a:t>
+              </a:r>
+              <a:r>
+                <a:rPr lang="en-IN" dirty="0" smtClean="0"/>
+                <a:t>num</a:t>
+              </a:r>
+              <a:endParaRPr lang="en-US" dirty="0"/>
+            </a:p>
+          </p:txBody>
+        </p:sp>
+        <p:cxnSp>
+          <p:nvCxnSpPr>
+            <p:cNvPr id="7" name="Straight Arrow Connector 6"/>
+            <p:cNvCxnSpPr/>
+            <p:nvPr/>
+          </p:nvCxnSpPr>
+          <p:spPr>
+            <a:xfrm rot="5400000">
+              <a:off x="2774654" y="1479327"/>
+              <a:ext cx="339330" cy="1588"/>
+            </a:xfrm>
+            <a:prstGeom prst="straightConnector1">
+              <a:avLst/>
+            </a:prstGeom>
+            <a:ln>
+              <a:tailEnd type="arrow"/>
+            </a:ln>
+          </p:spPr>
+          <p:style>
+            <a:lnRef idx="1">
+              <a:schemeClr val="dk1"/>
+            </a:lnRef>
+            <a:fillRef idx="0">
+              <a:schemeClr val="dk1"/>
+            </a:fillRef>
+            <a:effectRef idx="0">
+              <a:schemeClr val="dk1"/>
+            </a:effectRef>
+            <a:fontRef idx="minor">
+              <a:schemeClr val="tx1"/>
+            </a:fontRef>
+          </p:style>
+        </p:cxnSp>
+        <p:cxnSp>
+          <p:nvCxnSpPr>
+            <p:cNvPr id="8" name="Straight Arrow Connector 7"/>
+            <p:cNvCxnSpPr>
+              <a:stCxn id="4" idx="4"/>
+              <a:endCxn id="28" idx="0"/>
+            </p:cNvCxnSpPr>
+            <p:nvPr/>
+          </p:nvCxnSpPr>
+          <p:spPr>
+            <a:xfrm rot="5400000">
+              <a:off x="2828232" y="2265145"/>
+              <a:ext cx="232174" cy="1588"/>
+            </a:xfrm>
+            <a:prstGeom prst="straightConnector1">
+              <a:avLst/>
+            </a:prstGeom>
+            <a:ln>
+              <a:tailEnd type="arrow"/>
+            </a:ln>
+          </p:spPr>
+          <p:style>
+            <a:lnRef idx="1">
+              <a:schemeClr val="dk1"/>
+            </a:lnRef>
+            <a:fillRef idx="0">
+              <a:schemeClr val="dk1"/>
+            </a:fillRef>
+            <a:effectRef idx="0">
+              <a:schemeClr val="dk1"/>
+            </a:effectRef>
+            <a:fontRef idx="minor">
+              <a:schemeClr val="tx1"/>
+            </a:fontRef>
+          </p:style>
+        </p:cxnSp>
+        <p:sp>
+          <p:nvSpPr>
+            <p:cNvPr id="28" name="Flowchart: Decision 27"/>
+            <p:cNvSpPr/>
+            <p:nvPr/>
+          </p:nvSpPr>
+          <p:spPr>
+            <a:xfrm>
+              <a:off x="2066705" y="2381232"/>
+              <a:ext cx="1755228" cy="1000132"/>
+            </a:xfrm>
+            <a:prstGeom prst="flowChartDecision">
+              <a:avLst/>
+            </a:prstGeom>
+          </p:spPr>
+          <p:style>
+            <a:lnRef idx="2">
+              <a:schemeClr val="dk1"/>
+            </a:lnRef>
+            <a:fillRef idx="1">
+              <a:schemeClr val="lt1"/>
+            </a:fillRef>
+            <a:effectRef idx="0">
+              <a:schemeClr val="dk1"/>
+            </a:effectRef>
+            <a:fontRef idx="minor">
+              <a:schemeClr val="dk1"/>
+            </a:fontRef>
+          </p:style>
+          <p:txBody>
+            <a:bodyPr wrap="none" rtlCol="0" anchor="ctr"/>
+            <a:lstStyle/>
+            <a:p>
+              <a:pPr algn="ctr"/>
+              <a:endParaRPr lang="en-IN" dirty="0" smtClean="0"/>
+            </a:p>
+            <a:p>
+              <a:pPr algn="ctr"/>
+              <a:r>
+                <a:rPr lang="en-IN" dirty="0" smtClean="0"/>
+                <a:t>num % </a:t>
+              </a:r>
+              <a:r>
+                <a:rPr lang="en-IN" dirty="0" smtClean="0"/>
+                <a:t>2</a:t>
+              </a:r>
+              <a:r>
+                <a:rPr lang="en-IN" dirty="0" smtClean="0"/>
+                <a:t> </a:t>
+              </a:r>
+              <a:r>
+                <a:rPr lang="en-IN" dirty="0" smtClean="0"/>
+                <a:t>= 0</a:t>
+              </a:r>
+            </a:p>
+            <a:p>
+              <a:pPr algn="ctr"/>
+              <a:r>
+                <a:rPr lang="en-IN" dirty="0" smtClean="0"/>
+                <a:t>?</a:t>
+              </a:r>
+              <a:endParaRPr lang="en-US" dirty="0"/>
+            </a:p>
+          </p:txBody>
+        </p:sp>
+        <p:sp>
+          <p:nvSpPr>
+            <p:cNvPr id="34" name="Flowchart: Display 33"/>
+            <p:cNvSpPr/>
+            <p:nvPr/>
+          </p:nvSpPr>
+          <p:spPr>
+            <a:xfrm>
+              <a:off x="1959572" y="3738554"/>
+              <a:ext cx="1969494" cy="642942"/>
+            </a:xfrm>
+            <a:prstGeom prst="flowChartDisplay">
+              <a:avLst/>
+            </a:prstGeom>
+          </p:spPr>
+          <p:style>
+            <a:lnRef idx="2">
+              <a:schemeClr val="dk1"/>
+            </a:lnRef>
+            <a:fillRef idx="1">
+              <a:schemeClr val="lt1"/>
+            </a:fillRef>
+            <a:effectRef idx="0">
+              <a:schemeClr val="dk1"/>
+            </a:effectRef>
+            <a:fontRef idx="minor">
+              <a:schemeClr val="dk1"/>
+            </a:fontRef>
+          </p:style>
+          <p:txBody>
+            <a:bodyPr wrap="none" rtlCol="0" anchor="ctr"/>
+            <a:lstStyle/>
+            <a:p>
+              <a:pPr algn="ctr"/>
+              <a:r>
+                <a:rPr lang="en-IN" dirty="0" smtClean="0"/>
+                <a:t>EVEN</a:t>
+              </a:r>
+              <a:endParaRPr lang="en-US" dirty="0"/>
+            </a:p>
+          </p:txBody>
+        </p:sp>
+        <p:cxnSp>
+          <p:nvCxnSpPr>
+            <p:cNvPr id="35" name="Straight Arrow Connector 34"/>
+            <p:cNvCxnSpPr/>
+            <p:nvPr/>
+          </p:nvCxnSpPr>
+          <p:spPr>
+            <a:xfrm rot="5400000">
+              <a:off x="2801443" y="3524240"/>
+              <a:ext cx="285752" cy="1588"/>
+            </a:xfrm>
+            <a:prstGeom prst="straightConnector1">
+              <a:avLst/>
+            </a:prstGeom>
+            <a:ln>
+              <a:tailEnd type="arrow"/>
+            </a:ln>
+          </p:spPr>
+          <p:style>
+            <a:lnRef idx="1">
+              <a:schemeClr val="dk1"/>
+            </a:lnRef>
+            <a:fillRef idx="0">
+              <a:schemeClr val="dk1"/>
+            </a:fillRef>
+            <a:effectRef idx="0">
+              <a:schemeClr val="dk1"/>
+            </a:effectRef>
+            <a:fontRef idx="minor">
+              <a:schemeClr val="tx1"/>
+            </a:fontRef>
+          </p:style>
+        </p:cxnSp>
+        <p:sp>
+          <p:nvSpPr>
+            <p:cNvPr id="69" name="Flowchart: Display 68"/>
+            <p:cNvSpPr/>
+            <p:nvPr/>
+          </p:nvSpPr>
+          <p:spPr>
+            <a:xfrm>
+              <a:off x="4572008" y="3738554"/>
+              <a:ext cx="1727212" cy="642942"/>
+            </a:xfrm>
+            <a:prstGeom prst="flowChartDisplay">
+              <a:avLst/>
+            </a:prstGeom>
+          </p:spPr>
+          <p:style>
+            <a:lnRef idx="2">
+              <a:schemeClr val="dk1"/>
+            </a:lnRef>
+            <a:fillRef idx="1">
+              <a:schemeClr val="lt1"/>
+            </a:fillRef>
+            <a:effectRef idx="0">
+              <a:schemeClr val="dk1"/>
+            </a:effectRef>
+            <a:fontRef idx="minor">
+              <a:schemeClr val="dk1"/>
+            </a:fontRef>
+          </p:style>
+          <p:txBody>
+            <a:bodyPr wrap="none" rtlCol="0" anchor="ctr"/>
+            <a:lstStyle/>
+            <a:p>
+              <a:pPr algn="ctr"/>
+              <a:r>
+                <a:rPr lang="en-IN" dirty="0" smtClean="0"/>
+                <a:t>ODD</a:t>
+              </a:r>
+              <a:endParaRPr lang="en-US" dirty="0"/>
+            </a:p>
+          </p:txBody>
+        </p:sp>
+        <p:sp>
+          <p:nvSpPr>
+            <p:cNvPr id="70" name="Oval 69"/>
+            <p:cNvSpPr/>
+            <p:nvPr/>
+          </p:nvSpPr>
+          <p:spPr>
+            <a:xfrm>
+              <a:off x="2285992" y="5024438"/>
+              <a:ext cx="1303334" cy="500066"/>
+            </a:xfrm>
+            <a:prstGeom prst="ellipse">
+              <a:avLst/>
+            </a:prstGeom>
+          </p:spPr>
+          <p:style>
+            <a:lnRef idx="2">
+              <a:schemeClr val="dk1"/>
+            </a:lnRef>
+            <a:fillRef idx="1">
+              <a:schemeClr val="lt1"/>
+            </a:fillRef>
+            <a:effectRef idx="0">
+              <a:schemeClr val="dk1"/>
+            </a:effectRef>
+            <a:fontRef idx="minor">
+              <a:schemeClr val="dk1"/>
+            </a:fontRef>
+          </p:style>
+          <p:txBody>
+            <a:bodyPr wrap="none" rtlCol="0" anchor="ctr"/>
+            <a:lstStyle/>
+            <a:p>
+              <a:pPr algn="ctr"/>
+              <a:r>
+                <a:rPr lang="en-IN" dirty="0" smtClean="0"/>
+                <a:t>stop</a:t>
+              </a:r>
+              <a:endParaRPr lang="en-US" dirty="0"/>
+            </a:p>
+          </p:txBody>
+        </p:sp>
+        <p:cxnSp>
+          <p:nvCxnSpPr>
+            <p:cNvPr id="71" name="Straight Arrow Connector 70"/>
+            <p:cNvCxnSpPr>
+              <a:stCxn id="34" idx="2"/>
+              <a:endCxn id="70" idx="0"/>
+            </p:cNvCxnSpPr>
+            <p:nvPr/>
+          </p:nvCxnSpPr>
+          <p:spPr>
+            <a:xfrm rot="5400000">
+              <a:off x="2619518" y="4699637"/>
+              <a:ext cx="642942" cy="6660"/>
+            </a:xfrm>
+            <a:prstGeom prst="straightConnector1">
+              <a:avLst/>
+            </a:prstGeom>
+            <a:ln>
+              <a:tailEnd type="arrow"/>
+            </a:ln>
+          </p:spPr>
+          <p:style>
+            <a:lnRef idx="1">
+              <a:schemeClr val="dk1"/>
+            </a:lnRef>
+            <a:fillRef idx="0">
+              <a:schemeClr val="dk1"/>
+            </a:fillRef>
+            <a:effectRef idx="0">
+              <a:schemeClr val="dk1"/>
+            </a:effectRef>
+            <a:fontRef idx="minor">
+              <a:schemeClr val="tx1"/>
+            </a:fontRef>
+          </p:style>
+        </p:cxnSp>
+        <p:cxnSp>
+          <p:nvCxnSpPr>
+            <p:cNvPr id="83" name="Elbow Connector 77"/>
+            <p:cNvCxnSpPr>
+              <a:stCxn id="69" idx="2"/>
+              <a:endCxn id="70" idx="6"/>
+            </p:cNvCxnSpPr>
+            <p:nvPr/>
+          </p:nvCxnSpPr>
+          <p:spPr>
+            <a:xfrm rot="5400000">
+              <a:off x="4065983" y="3904839"/>
+              <a:ext cx="892975" cy="1846288"/>
+            </a:xfrm>
+            <a:prstGeom prst="bentConnector2">
+              <a:avLst/>
+            </a:prstGeom>
+            <a:ln>
+              <a:tailEnd type="arrow"/>
+            </a:ln>
+          </p:spPr>
+          <p:style>
+            <a:lnRef idx="1">
+              <a:schemeClr val="dk1"/>
+            </a:lnRef>
+            <a:fillRef idx="0">
+              <a:schemeClr val="dk1"/>
+            </a:fillRef>
+            <a:effectRef idx="0">
+              <a:schemeClr val="dk1"/>
+            </a:effectRef>
+            <a:fontRef idx="minor">
+              <a:schemeClr val="tx1"/>
+            </a:fontRef>
+          </p:style>
+        </p:cxnSp>
+        <p:cxnSp>
+          <p:nvCxnSpPr>
+            <p:cNvPr id="95" name="Elbow Connector 77"/>
+            <p:cNvCxnSpPr>
+              <a:stCxn id="28" idx="3"/>
+              <a:endCxn id="69" idx="0"/>
+            </p:cNvCxnSpPr>
+            <p:nvPr/>
+          </p:nvCxnSpPr>
+          <p:spPr>
+            <a:xfrm>
+              <a:off x="3821933" y="2881298"/>
+              <a:ext cx="1613681" cy="857256"/>
+            </a:xfrm>
+            <a:prstGeom prst="bentConnector2">
+              <a:avLst/>
+            </a:prstGeom>
+            <a:ln>
+              <a:tailEnd type="arrow"/>
+            </a:ln>
+          </p:spPr>
+          <p:style>
+            <a:lnRef idx="1">
+              <a:schemeClr val="dk1"/>
+            </a:lnRef>
+            <a:fillRef idx="0">
+              <a:schemeClr val="dk1"/>
+            </a:fillRef>
+            <a:effectRef idx="0">
+              <a:schemeClr val="dk1"/>
+            </a:effectRef>
+            <a:fontRef idx="minor">
+              <a:schemeClr val="tx1"/>
+            </a:fontRef>
+          </p:style>
+        </p:cxnSp>
+        <p:sp>
+          <p:nvSpPr>
+            <p:cNvPr id="99" name="TextBox 98"/>
+            <p:cNvSpPr txBox="1"/>
+            <p:nvPr/>
+          </p:nvSpPr>
+          <p:spPr>
+            <a:xfrm>
+              <a:off x="2928934" y="3309926"/>
+              <a:ext cx="607218" cy="369332"/>
+            </a:xfrm>
+            <a:prstGeom prst="rect">
+              <a:avLst/>
+            </a:prstGeom>
+            <a:noFill/>
+          </p:spPr>
+          <p:txBody>
+            <a:bodyPr wrap="none" rtlCol="0">
+              <a:spAutoFit/>
+            </a:bodyPr>
+            <a:lstStyle/>
+            <a:p>
+              <a:r>
+                <a:rPr lang="en-IN" i="1" dirty="0" smtClean="0"/>
+                <a:t>True</a:t>
+              </a:r>
+              <a:endParaRPr lang="en-US" i="1" dirty="0"/>
+            </a:p>
+          </p:txBody>
+        </p:sp>
+        <p:sp>
+          <p:nvSpPr>
+            <p:cNvPr id="102" name="TextBox 101"/>
+            <p:cNvSpPr txBox="1"/>
+            <p:nvPr/>
+          </p:nvSpPr>
+          <p:spPr>
+            <a:xfrm>
+              <a:off x="4286256" y="2511966"/>
+              <a:ext cx="659219" cy="369332"/>
+            </a:xfrm>
+            <a:prstGeom prst="rect">
+              <a:avLst/>
+            </a:prstGeom>
+            <a:noFill/>
+          </p:spPr>
+          <p:txBody>
+            <a:bodyPr wrap="none" rtlCol="0">
+              <a:spAutoFit/>
+            </a:bodyPr>
+            <a:lstStyle/>
+            <a:p>
+              <a:r>
+                <a:rPr lang="en-IN" i="1" dirty="0" smtClean="0"/>
+                <a:t>False</a:t>
+              </a:r>
+              <a:endParaRPr lang="en-US" i="1" dirty="0"/>
+            </a:p>
+          </p:txBody>
+        </p:sp>
+      </p:grpSp>
+      <p:sp>
+        <p:nvSpPr>
+          <p:cNvPr id="29" name="Rectangle 28"/>
+          <p:cNvSpPr/>
+          <p:nvPr/>
+        </p:nvSpPr>
+        <p:spPr>
+          <a:xfrm>
+            <a:off x="4286256" y="523844"/>
+            <a:ext cx="2286016" cy="500066"/>
+          </a:xfrm>
+          <a:prstGeom prst="rect">
+            <a:avLst/>
+          </a:prstGeom>
+        </p:spPr>
+        <p:style>
+          <a:lnRef idx="1">
+            <a:schemeClr val="accent3"/>
+          </a:lnRef>
+          <a:fillRef idx="2">
+            <a:schemeClr val="accent3"/>
+          </a:fillRef>
+          <a:effectRef idx="1">
+            <a:schemeClr val="accent3"/>
+          </a:effectRef>
+          <a:fontRef idx="minor">
+            <a:schemeClr val="dk1"/>
+          </a:fontRef>
+        </p:style>
+        <p:txBody>
+          <a:bodyPr rtlCol="0" anchor="ctr"/>
+          <a:lstStyle/>
+          <a:p>
+            <a:pPr algn="ctr"/>
+            <a:r>
+              <a:rPr lang="en-IN" dirty="0" smtClean="0"/>
+              <a:t>Finding Number is ODD and EVEN</a:t>
+            </a:r>
+            <a:endParaRPr lang="en-US" dirty="0"/>
+          </a:p>
+        </p:txBody>
+      </p:sp>
+    </p:spTree>
+  </p:cSld>
+  <p:clrMapOvr>
+    <a:masterClrMapping/>
+  </p:clrMapOvr>
+</p:sld>
+</file>
+
+<file path=ppt/slides/slide15.xml><?xml version="1.0" encoding="utf-8"?>
 <p:sld xmlns:a="http://schemas.openxmlformats.org/drawingml/2006/main" xmlns:r="http://schemas.openxmlformats.org/officeDocument/2006/relationships" xmlns:p="http://schemas.openxmlformats.org/presentationml/2006/main">
   <p:cSld>
     <p:spTree>

</xml_diff>

<commit_message>
Last Update 26-09-2018 17:52:10.19
</commit_message>
<xml_diff>
--- a/Slides/Unit 1/GE8151-U1-5.1-Flow-Charts.pptx
+++ b/Slides/Unit 1/GE8151-U1-5.1-Flow-Charts.pptx
@@ -303,7 +303,7 @@
             <a:fld id="{A9953F39-409C-4934-84CB-8EF94422C604}" type="datetimeFigureOut">
               <a:rPr lang="en-US" smtClean="0"/>
               <a:pPr/>
-              <a:t>9/24/2018</a:t>
+              <a:t>9/26/2018</a:t>
             </a:fld>
             <a:endParaRPr lang="en-US"/>
           </a:p>
@@ -470,7 +470,7 @@
             <a:fld id="{A9953F39-409C-4934-84CB-8EF94422C604}" type="datetimeFigureOut">
               <a:rPr lang="en-US" smtClean="0"/>
               <a:pPr/>
-              <a:t>9/24/2018</a:t>
+              <a:t>9/26/2018</a:t>
             </a:fld>
             <a:endParaRPr lang="en-US"/>
           </a:p>
@@ -647,7 +647,7 @@
             <a:fld id="{A9953F39-409C-4934-84CB-8EF94422C604}" type="datetimeFigureOut">
               <a:rPr lang="en-US" smtClean="0"/>
               <a:pPr/>
-              <a:t>9/24/2018</a:t>
+              <a:t>9/26/2018</a:t>
             </a:fld>
             <a:endParaRPr lang="en-US"/>
           </a:p>
@@ -814,7 +814,7 @@
             <a:fld id="{A9953F39-409C-4934-84CB-8EF94422C604}" type="datetimeFigureOut">
               <a:rPr lang="en-US" smtClean="0"/>
               <a:pPr/>
-              <a:t>9/24/2018</a:t>
+              <a:t>9/26/2018</a:t>
             </a:fld>
             <a:endParaRPr lang="en-US"/>
           </a:p>
@@ -1057,7 +1057,7 @@
             <a:fld id="{A9953F39-409C-4934-84CB-8EF94422C604}" type="datetimeFigureOut">
               <a:rPr lang="en-US" smtClean="0"/>
               <a:pPr/>
-              <a:t>9/24/2018</a:t>
+              <a:t>9/26/2018</a:t>
             </a:fld>
             <a:endParaRPr lang="en-US"/>
           </a:p>
@@ -1342,7 +1342,7 @@
             <a:fld id="{A9953F39-409C-4934-84CB-8EF94422C604}" type="datetimeFigureOut">
               <a:rPr lang="en-US" smtClean="0"/>
               <a:pPr/>
-              <a:t>9/24/2018</a:t>
+              <a:t>9/26/2018</a:t>
             </a:fld>
             <a:endParaRPr lang="en-US"/>
           </a:p>
@@ -1761,7 +1761,7 @@
             <a:fld id="{A9953F39-409C-4934-84CB-8EF94422C604}" type="datetimeFigureOut">
               <a:rPr lang="en-US" smtClean="0"/>
               <a:pPr/>
-              <a:t>9/24/2018</a:t>
+              <a:t>9/26/2018</a:t>
             </a:fld>
             <a:endParaRPr lang="en-US"/>
           </a:p>
@@ -1876,7 +1876,7 @@
             <a:fld id="{A9953F39-409C-4934-84CB-8EF94422C604}" type="datetimeFigureOut">
               <a:rPr lang="en-US" smtClean="0"/>
               <a:pPr/>
-              <a:t>9/24/2018</a:t>
+              <a:t>9/26/2018</a:t>
             </a:fld>
             <a:endParaRPr lang="en-US"/>
           </a:p>
@@ -1968,7 +1968,7 @@
             <a:fld id="{A9953F39-409C-4934-84CB-8EF94422C604}" type="datetimeFigureOut">
               <a:rPr lang="en-US" smtClean="0"/>
               <a:pPr/>
-              <a:t>9/24/2018</a:t>
+              <a:t>9/26/2018</a:t>
             </a:fld>
             <a:endParaRPr lang="en-US"/>
           </a:p>
@@ -2242,7 +2242,7 @@
             <a:fld id="{A9953F39-409C-4934-84CB-8EF94422C604}" type="datetimeFigureOut">
               <a:rPr lang="en-US" smtClean="0"/>
               <a:pPr/>
-              <a:t>9/24/2018</a:t>
+              <a:t>9/26/2018</a:t>
             </a:fld>
             <a:endParaRPr lang="en-US"/>
           </a:p>
@@ -2492,7 +2492,7 @@
             <a:fld id="{A9953F39-409C-4934-84CB-8EF94422C604}" type="datetimeFigureOut">
               <a:rPr lang="en-US" smtClean="0"/>
               <a:pPr/>
-              <a:t>9/24/2018</a:t>
+              <a:t>9/26/2018</a:t>
             </a:fld>
             <a:endParaRPr lang="en-US"/>
           </a:p>
@@ -2702,7 +2702,7 @@
             <a:fld id="{A9953F39-409C-4934-84CB-8EF94422C604}" type="datetimeFigureOut">
               <a:rPr lang="en-US" smtClean="0"/>
               <a:pPr/>
-              <a:t>9/24/2018</a:t>
+              <a:t>9/26/2018</a:t>
             </a:fld>
             <a:endParaRPr lang="en-US"/>
           </a:p>
@@ -7530,11 +7530,7 @@
               <a:pPr algn="ctr"/>
               <a:r>
                 <a:rPr lang="en-IN" dirty="0" smtClean="0"/>
-                <a:t>read  </a:t>
-              </a:r>
-              <a:r>
-                <a:rPr lang="en-IN" dirty="0" smtClean="0"/>
-                <a:t>num</a:t>
+                <a:t>read  num</a:t>
               </a:r>
               <a:endParaRPr lang="en-US" dirty="0"/>
             </a:p>
@@ -7649,19 +7645,7 @@
               <a:pPr algn="ctr"/>
               <a:r>
                 <a:rPr lang="en-IN" dirty="0" smtClean="0"/>
-                <a:t>num % </a:t>
-              </a:r>
-              <a:r>
-                <a:rPr lang="en-IN" dirty="0" smtClean="0"/>
-                <a:t>2</a:t>
-              </a:r>
-              <a:r>
-                <a:rPr lang="en-IN" dirty="0" smtClean="0"/>
-                <a:t> </a:t>
-              </a:r>
-              <a:r>
-                <a:rPr lang="en-IN" dirty="0" smtClean="0"/>
-                <a:t>= 0</a:t>
+                <a:t>num % 2 = 0</a:t>
               </a:r>
             </a:p>
             <a:p>
@@ -11604,788 +11588,771 @@
           <a:chExt cx="0" cy="0"/>
         </a:xfrm>
       </p:grpSpPr>
-      <p:grpSp>
-        <p:nvGrpSpPr>
-          <p:cNvPr id="51" name="Group 50"/>
-          <p:cNvGrpSpPr/>
-          <p:nvPr/>
-        </p:nvGrpSpPr>
-        <p:grpSpPr>
+      <p:sp>
+        <p:nvSpPr>
+          <p:cNvPr id="5" name="Oval 4"/>
+          <p:cNvSpPr/>
+          <p:nvPr/>
+        </p:nvSpPr>
+        <p:spPr>
           <a:xfrm>
-            <a:off x="1928802" y="523844"/>
-            <a:ext cx="3767740" cy="7572428"/>
-            <a:chOff x="1928802" y="523844"/>
-            <a:chExt cx="3767740" cy="7572428"/>
-          </a:xfrm>
-        </p:grpSpPr>
-        <p:sp>
-          <p:nvSpPr>
-            <p:cNvPr id="5" name="Oval 4"/>
-            <p:cNvSpPr/>
-            <p:nvPr/>
-          </p:nvSpPr>
-          <p:spPr>
-            <a:xfrm>
-              <a:off x="2670176" y="523844"/>
-              <a:ext cx="1303334" cy="500066"/>
-            </a:xfrm>
-            <a:prstGeom prst="ellipse">
-              <a:avLst/>
-            </a:prstGeom>
-          </p:spPr>
-          <p:style>
-            <a:lnRef idx="2">
-              <a:schemeClr val="dk1"/>
-            </a:lnRef>
-            <a:fillRef idx="1">
-              <a:schemeClr val="lt1"/>
-            </a:fillRef>
-            <a:effectRef idx="0">
-              <a:schemeClr val="dk1"/>
-            </a:effectRef>
-            <a:fontRef idx="minor">
-              <a:schemeClr val="dk1"/>
-            </a:fontRef>
-          </p:style>
-          <p:txBody>
-            <a:bodyPr wrap="none" rtlCol="0" anchor="ctr"/>
-            <a:lstStyle/>
-            <a:p>
-              <a:pPr algn="ctr"/>
-              <a:r>
-                <a:rPr lang="en-IN" dirty="0" smtClean="0"/>
-                <a:t>start</a:t>
-              </a:r>
-              <a:endParaRPr lang="en-US" dirty="0"/>
-            </a:p>
-          </p:txBody>
-        </p:sp>
-        <p:sp>
-          <p:nvSpPr>
-            <p:cNvPr id="7" name="Flowchart: Data 6"/>
-            <p:cNvSpPr/>
-            <p:nvPr/>
-          </p:nvSpPr>
-          <p:spPr>
-            <a:xfrm>
-              <a:off x="2250273" y="1363240"/>
-              <a:ext cx="2143140" cy="500066"/>
-            </a:xfrm>
-            <a:prstGeom prst="flowChartInputOutput">
-              <a:avLst/>
-            </a:prstGeom>
-          </p:spPr>
-          <p:style>
-            <a:lnRef idx="2">
-              <a:schemeClr val="dk1"/>
-            </a:lnRef>
-            <a:fillRef idx="1">
-              <a:schemeClr val="lt1"/>
-            </a:fillRef>
-            <a:effectRef idx="0">
-              <a:schemeClr val="dk1"/>
-            </a:effectRef>
-            <a:fontRef idx="minor">
-              <a:schemeClr val="dk1"/>
-            </a:fontRef>
-          </p:style>
-          <p:txBody>
-            <a:bodyPr wrap="none" rtlCol="0" anchor="ctr"/>
-            <a:lstStyle/>
-            <a:p>
-              <a:pPr algn="ctr"/>
-              <a:r>
-                <a:rPr lang="en-IN" dirty="0" smtClean="0"/>
-                <a:t>read number </a:t>
-              </a:r>
-              <a:endParaRPr lang="en-US" dirty="0"/>
-            </a:p>
-          </p:txBody>
-        </p:sp>
-        <p:sp>
-          <p:nvSpPr>
-            <p:cNvPr id="9" name="Rectangle 8"/>
-            <p:cNvSpPr/>
-            <p:nvPr/>
-          </p:nvSpPr>
-          <p:spPr>
-            <a:xfrm>
-              <a:off x="2250273" y="2202636"/>
-              <a:ext cx="2143140" cy="500066"/>
-            </a:xfrm>
-            <a:prstGeom prst="rect">
-              <a:avLst/>
-            </a:prstGeom>
-          </p:spPr>
-          <p:style>
-            <a:lnRef idx="2">
-              <a:schemeClr val="dk1"/>
-            </a:lnRef>
-            <a:fillRef idx="1">
-              <a:schemeClr val="lt1"/>
-            </a:fillRef>
-            <a:effectRef idx="0">
-              <a:schemeClr val="dk1"/>
-            </a:effectRef>
-            <a:fontRef idx="minor">
-              <a:schemeClr val="dk1"/>
-            </a:fontRef>
-          </p:style>
-          <p:txBody>
-            <a:bodyPr wrap="none" rtlCol="0" anchor="ctr"/>
-            <a:lstStyle/>
-            <a:p>
-              <a:pPr algn="ctr"/>
-              <a:r>
-                <a:rPr lang="en-IN" dirty="0" smtClean="0"/>
-                <a:t>guess  = 1 </a:t>
-              </a:r>
-              <a:endParaRPr lang="en-US" dirty="0"/>
-            </a:p>
-          </p:txBody>
-        </p:sp>
-        <p:sp>
-          <p:nvSpPr>
-            <p:cNvPr id="12" name="Rectangle 11"/>
-            <p:cNvSpPr/>
-            <p:nvPr/>
-          </p:nvSpPr>
-          <p:spPr>
-            <a:xfrm>
-              <a:off x="1928802" y="3042032"/>
-              <a:ext cx="2786082" cy="500066"/>
-            </a:xfrm>
-            <a:prstGeom prst="rect">
-              <a:avLst/>
-            </a:prstGeom>
-          </p:spPr>
-          <p:style>
-            <a:lnRef idx="2">
-              <a:schemeClr val="dk1"/>
-            </a:lnRef>
-            <a:fillRef idx="1">
-              <a:schemeClr val="lt1"/>
-            </a:fillRef>
-            <a:effectRef idx="0">
-              <a:schemeClr val="dk1"/>
-            </a:effectRef>
-            <a:fontRef idx="minor">
-              <a:schemeClr val="dk1"/>
-            </a:fontRef>
-          </p:style>
-          <p:txBody>
-            <a:bodyPr wrap="none" rtlCol="0" anchor="ctr"/>
-            <a:lstStyle/>
-            <a:p>
-              <a:pPr algn="ctr"/>
-              <a:r>
-                <a:rPr lang="en-IN" dirty="0" err="1" smtClean="0"/>
-                <a:t>fx</a:t>
-              </a:r>
-              <a:r>
-                <a:rPr lang="en-IN" dirty="0" smtClean="0"/>
-                <a:t> = guess * guess - number</a:t>
-              </a:r>
-              <a:endParaRPr lang="en-US" dirty="0"/>
-            </a:p>
-          </p:txBody>
-        </p:sp>
-        <p:sp>
-          <p:nvSpPr>
-            <p:cNvPr id="13" name="Rectangle 12"/>
-            <p:cNvSpPr/>
-            <p:nvPr/>
-          </p:nvSpPr>
-          <p:spPr>
-            <a:xfrm>
-              <a:off x="2428868" y="3881428"/>
-              <a:ext cx="1785950" cy="500066"/>
-            </a:xfrm>
-            <a:prstGeom prst="rect">
-              <a:avLst/>
-            </a:prstGeom>
-          </p:spPr>
-          <p:style>
-            <a:lnRef idx="2">
-              <a:schemeClr val="dk1"/>
-            </a:lnRef>
-            <a:fillRef idx="1">
-              <a:schemeClr val="lt1"/>
-            </a:fillRef>
-            <a:effectRef idx="0">
-              <a:schemeClr val="dk1"/>
-            </a:effectRef>
-            <a:fontRef idx="minor">
-              <a:schemeClr val="dk1"/>
-            </a:fontRef>
-          </p:style>
-          <p:txBody>
-            <a:bodyPr wrap="none" rtlCol="0" anchor="ctr"/>
-            <a:lstStyle/>
-            <a:p>
-              <a:pPr algn="ctr"/>
-              <a:r>
-                <a:rPr lang="en-IN" dirty="0" err="1" smtClean="0"/>
-                <a:t>dx</a:t>
-              </a:r>
-              <a:r>
-                <a:rPr lang="en-IN" dirty="0" smtClean="0"/>
-                <a:t> = 2 * guess</a:t>
-              </a:r>
-              <a:endParaRPr lang="en-US" dirty="0"/>
-            </a:p>
-          </p:txBody>
-        </p:sp>
-        <p:sp>
-          <p:nvSpPr>
-            <p:cNvPr id="15" name="Rectangle 14"/>
-            <p:cNvSpPr/>
-            <p:nvPr/>
-          </p:nvSpPr>
-          <p:spPr>
-            <a:xfrm>
-              <a:off x="1928802" y="4720824"/>
-              <a:ext cx="2786082" cy="500066"/>
-            </a:xfrm>
-            <a:prstGeom prst="rect">
-              <a:avLst/>
-            </a:prstGeom>
-          </p:spPr>
-          <p:style>
-            <a:lnRef idx="2">
-              <a:schemeClr val="dk1"/>
-            </a:lnRef>
-            <a:fillRef idx="1">
-              <a:schemeClr val="lt1"/>
-            </a:fillRef>
-            <a:effectRef idx="0">
-              <a:schemeClr val="dk1"/>
-            </a:effectRef>
-            <a:fontRef idx="minor">
-              <a:schemeClr val="dk1"/>
-            </a:fontRef>
-          </p:style>
-          <p:txBody>
-            <a:bodyPr wrap="none" rtlCol="0" anchor="ctr"/>
-            <a:lstStyle/>
-            <a:p>
-              <a:pPr algn="ctr"/>
-              <a:r>
-                <a:rPr lang="en-IN" dirty="0" smtClean="0"/>
-                <a:t>actual = guess – ( </a:t>
-              </a:r>
-              <a:r>
-                <a:rPr lang="en-IN" dirty="0" err="1" smtClean="0"/>
-                <a:t>fx</a:t>
-              </a:r>
-              <a:r>
-                <a:rPr lang="en-IN" dirty="0" smtClean="0"/>
-                <a:t> / </a:t>
-              </a:r>
-              <a:r>
-                <a:rPr lang="en-IN" dirty="0" err="1" smtClean="0"/>
-                <a:t>dx</a:t>
-              </a:r>
-              <a:r>
-                <a:rPr lang="en-IN" dirty="0" smtClean="0"/>
-                <a:t> )</a:t>
-              </a:r>
-              <a:endParaRPr lang="en-US" dirty="0"/>
-            </a:p>
-          </p:txBody>
-        </p:sp>
-        <p:sp>
-          <p:nvSpPr>
-            <p:cNvPr id="16" name="Flowchart: Decision 15"/>
-            <p:cNvSpPr/>
-            <p:nvPr/>
-          </p:nvSpPr>
-          <p:spPr>
-            <a:xfrm>
-              <a:off x="1928802" y="5560220"/>
-              <a:ext cx="2786082" cy="857256"/>
-            </a:xfrm>
-            <a:prstGeom prst="flowChartDecision">
-              <a:avLst/>
-            </a:prstGeom>
-          </p:spPr>
-          <p:style>
-            <a:lnRef idx="2">
-              <a:schemeClr val="dk1"/>
-            </a:lnRef>
-            <a:fillRef idx="1">
-              <a:schemeClr val="lt1"/>
-            </a:fillRef>
-            <a:effectRef idx="0">
-              <a:schemeClr val="dk1"/>
-            </a:effectRef>
-            <a:fontRef idx="minor">
-              <a:schemeClr val="dk1"/>
-            </a:fontRef>
-          </p:style>
-          <p:txBody>
-            <a:bodyPr wrap="none" rtlCol="0" anchor="ctr"/>
-            <a:lstStyle/>
-            <a:p>
-              <a:pPr algn="ctr"/>
-              <a:r>
-                <a:rPr lang="en-IN" dirty="0" smtClean="0"/>
-                <a:t>actual = guess ?</a:t>
-              </a:r>
-              <a:endParaRPr lang="en-US" dirty="0"/>
-            </a:p>
-          </p:txBody>
-        </p:sp>
-        <p:sp>
-          <p:nvSpPr>
-            <p:cNvPr id="17" name="Flowchart: Data 16"/>
-            <p:cNvSpPr/>
-            <p:nvPr/>
-          </p:nvSpPr>
-          <p:spPr>
-            <a:xfrm>
-              <a:off x="1928802" y="6756806"/>
-              <a:ext cx="2786082" cy="500066"/>
-            </a:xfrm>
-            <a:prstGeom prst="flowChartInputOutput">
-              <a:avLst/>
-            </a:prstGeom>
-          </p:spPr>
-          <p:style>
-            <a:lnRef idx="2">
-              <a:schemeClr val="dk1"/>
-            </a:lnRef>
-            <a:fillRef idx="1">
-              <a:schemeClr val="lt1"/>
-            </a:fillRef>
-            <a:effectRef idx="0">
-              <a:schemeClr val="dk1"/>
-            </a:effectRef>
-            <a:fontRef idx="minor">
-              <a:schemeClr val="dk1"/>
-            </a:fontRef>
-          </p:style>
-          <p:txBody>
-            <a:bodyPr wrap="none" rtlCol="0" anchor="ctr"/>
-            <a:lstStyle/>
-            <a:p>
-              <a:pPr algn="ctr"/>
-              <a:r>
-                <a:rPr lang="en-IN" dirty="0" smtClean="0"/>
-                <a:t>print root is actual</a:t>
-              </a:r>
-              <a:endParaRPr lang="en-US" dirty="0"/>
-            </a:p>
-          </p:txBody>
-        </p:sp>
-        <p:sp>
-          <p:nvSpPr>
-            <p:cNvPr id="18" name="Oval 17"/>
-            <p:cNvSpPr/>
-            <p:nvPr/>
-          </p:nvSpPr>
-          <p:spPr>
-            <a:xfrm>
-              <a:off x="2670176" y="7596206"/>
-              <a:ext cx="1303334" cy="500066"/>
-            </a:xfrm>
-            <a:prstGeom prst="ellipse">
-              <a:avLst/>
-            </a:prstGeom>
-          </p:spPr>
-          <p:style>
-            <a:lnRef idx="2">
-              <a:schemeClr val="dk1"/>
-            </a:lnRef>
-            <a:fillRef idx="1">
-              <a:schemeClr val="lt1"/>
-            </a:fillRef>
-            <a:effectRef idx="0">
-              <a:schemeClr val="dk1"/>
-            </a:effectRef>
-            <a:fontRef idx="minor">
-              <a:schemeClr val="dk1"/>
-            </a:fontRef>
-          </p:style>
-          <p:txBody>
-            <a:bodyPr wrap="none" rtlCol="0" anchor="ctr"/>
-            <a:lstStyle/>
-            <a:p>
-              <a:pPr algn="ctr"/>
-              <a:r>
-                <a:rPr lang="en-IN" dirty="0" smtClean="0"/>
-                <a:t>stop</a:t>
-              </a:r>
-              <a:endParaRPr lang="en-US" dirty="0"/>
-            </a:p>
-          </p:txBody>
-        </p:sp>
-        <p:cxnSp>
-          <p:nvCxnSpPr>
-            <p:cNvPr id="20" name="Straight Arrow Connector 19"/>
-            <p:cNvCxnSpPr/>
-            <p:nvPr/>
-          </p:nvCxnSpPr>
-          <p:spPr>
-            <a:xfrm rot="5400000">
-              <a:off x="3178967" y="1192781"/>
-              <a:ext cx="285752" cy="1588"/>
-            </a:xfrm>
-            <a:prstGeom prst="straightConnector1">
-              <a:avLst/>
-            </a:prstGeom>
-            <a:ln>
-              <a:tailEnd type="arrow"/>
-            </a:ln>
-          </p:spPr>
-          <p:style>
-            <a:lnRef idx="1">
-              <a:schemeClr val="dk1"/>
-            </a:lnRef>
-            <a:fillRef idx="0">
-              <a:schemeClr val="dk1"/>
-            </a:fillRef>
-            <a:effectRef idx="0">
-              <a:schemeClr val="dk1"/>
-            </a:effectRef>
-            <a:fontRef idx="minor">
-              <a:schemeClr val="tx1"/>
-            </a:fontRef>
-          </p:style>
-        </p:cxnSp>
-        <p:cxnSp>
-          <p:nvCxnSpPr>
-            <p:cNvPr id="22" name="Straight Arrow Connector 21"/>
-            <p:cNvCxnSpPr/>
-            <p:nvPr/>
-          </p:nvCxnSpPr>
-          <p:spPr>
-            <a:xfrm rot="5400000">
-              <a:off x="3178967" y="2032177"/>
-              <a:ext cx="285752" cy="1588"/>
-            </a:xfrm>
-            <a:prstGeom prst="straightConnector1">
-              <a:avLst/>
-            </a:prstGeom>
-            <a:ln>
-              <a:tailEnd type="arrow"/>
-            </a:ln>
-          </p:spPr>
-          <p:style>
-            <a:lnRef idx="1">
-              <a:schemeClr val="dk1"/>
-            </a:lnRef>
-            <a:fillRef idx="0">
-              <a:schemeClr val="dk1"/>
-            </a:fillRef>
-            <a:effectRef idx="0">
-              <a:schemeClr val="dk1"/>
-            </a:effectRef>
-            <a:fontRef idx="minor">
-              <a:schemeClr val="tx1"/>
-            </a:fontRef>
-          </p:style>
-        </p:cxnSp>
-        <p:cxnSp>
-          <p:nvCxnSpPr>
-            <p:cNvPr id="25" name="Straight Arrow Connector 24"/>
-            <p:cNvCxnSpPr/>
-            <p:nvPr/>
-          </p:nvCxnSpPr>
-          <p:spPr>
-            <a:xfrm rot="5400000">
-              <a:off x="3143248" y="2871573"/>
-              <a:ext cx="357190" cy="1588"/>
-            </a:xfrm>
-            <a:prstGeom prst="straightConnector1">
-              <a:avLst/>
-            </a:prstGeom>
-            <a:ln>
-              <a:tailEnd type="arrow"/>
-            </a:ln>
-          </p:spPr>
-          <p:style>
-            <a:lnRef idx="1">
-              <a:schemeClr val="dk1"/>
-            </a:lnRef>
-            <a:fillRef idx="0">
-              <a:schemeClr val="dk1"/>
-            </a:fillRef>
-            <a:effectRef idx="0">
-              <a:schemeClr val="dk1"/>
-            </a:effectRef>
-            <a:fontRef idx="minor">
-              <a:schemeClr val="tx1"/>
-            </a:fontRef>
-          </p:style>
-        </p:cxnSp>
-        <p:cxnSp>
-          <p:nvCxnSpPr>
-            <p:cNvPr id="28" name="Straight Arrow Connector 27"/>
-            <p:cNvCxnSpPr/>
-            <p:nvPr/>
-          </p:nvCxnSpPr>
-          <p:spPr>
-            <a:xfrm rot="5400000">
-              <a:off x="3143248" y="3710969"/>
-              <a:ext cx="357190" cy="1588"/>
-            </a:xfrm>
-            <a:prstGeom prst="straightConnector1">
-              <a:avLst/>
-            </a:prstGeom>
-            <a:ln>
-              <a:tailEnd type="arrow"/>
-            </a:ln>
-          </p:spPr>
-          <p:style>
-            <a:lnRef idx="1">
-              <a:schemeClr val="dk1"/>
-            </a:lnRef>
-            <a:fillRef idx="0">
-              <a:schemeClr val="dk1"/>
-            </a:fillRef>
-            <a:effectRef idx="0">
-              <a:schemeClr val="dk1"/>
-            </a:effectRef>
-            <a:fontRef idx="minor">
-              <a:schemeClr val="tx1"/>
-            </a:fontRef>
-          </p:style>
-        </p:cxnSp>
-        <p:cxnSp>
-          <p:nvCxnSpPr>
-            <p:cNvPr id="31" name="Straight Arrow Connector 30"/>
-            <p:cNvCxnSpPr/>
-            <p:nvPr/>
-          </p:nvCxnSpPr>
-          <p:spPr>
-            <a:xfrm rot="5400000">
-              <a:off x="3143248" y="4550365"/>
-              <a:ext cx="357190" cy="1588"/>
-            </a:xfrm>
-            <a:prstGeom prst="straightConnector1">
-              <a:avLst/>
-            </a:prstGeom>
-            <a:ln>
-              <a:tailEnd type="arrow"/>
-            </a:ln>
-          </p:spPr>
-          <p:style>
-            <a:lnRef idx="1">
-              <a:schemeClr val="dk1"/>
-            </a:lnRef>
-            <a:fillRef idx="0">
-              <a:schemeClr val="dk1"/>
-            </a:fillRef>
-            <a:effectRef idx="0">
-              <a:schemeClr val="dk1"/>
-            </a:effectRef>
-            <a:fontRef idx="minor">
-              <a:schemeClr val="tx1"/>
-            </a:fontRef>
-          </p:style>
-        </p:cxnSp>
-        <p:cxnSp>
-          <p:nvCxnSpPr>
-            <p:cNvPr id="34" name="Straight Arrow Connector 33"/>
-            <p:cNvCxnSpPr/>
-            <p:nvPr/>
-          </p:nvCxnSpPr>
-          <p:spPr>
-            <a:xfrm rot="5400000">
-              <a:off x="3143248" y="5389761"/>
-              <a:ext cx="357190" cy="1588"/>
-            </a:xfrm>
-            <a:prstGeom prst="straightConnector1">
-              <a:avLst/>
-            </a:prstGeom>
-            <a:ln>
-              <a:tailEnd type="arrow"/>
-            </a:ln>
-          </p:spPr>
-          <p:style>
-            <a:lnRef idx="1">
-              <a:schemeClr val="dk1"/>
-            </a:lnRef>
-            <a:fillRef idx="0">
-              <a:schemeClr val="dk1"/>
-            </a:fillRef>
-            <a:effectRef idx="0">
-              <a:schemeClr val="dk1"/>
-            </a:effectRef>
-            <a:fontRef idx="minor">
-              <a:schemeClr val="tx1"/>
-            </a:fontRef>
-          </p:style>
-        </p:cxnSp>
-        <p:cxnSp>
-          <p:nvCxnSpPr>
-            <p:cNvPr id="37" name="Straight Arrow Connector 36"/>
-            <p:cNvCxnSpPr/>
-            <p:nvPr/>
-          </p:nvCxnSpPr>
-          <p:spPr>
-            <a:xfrm rot="5400000">
-              <a:off x="3178967" y="6586347"/>
-              <a:ext cx="285752" cy="1588"/>
-            </a:xfrm>
-            <a:prstGeom prst="straightConnector1">
-              <a:avLst/>
-            </a:prstGeom>
-            <a:ln>
-              <a:tailEnd type="arrow"/>
-            </a:ln>
-          </p:spPr>
-          <p:style>
-            <a:lnRef idx="1">
-              <a:schemeClr val="dk1"/>
-            </a:lnRef>
-            <a:fillRef idx="0">
-              <a:schemeClr val="dk1"/>
-            </a:fillRef>
-            <a:effectRef idx="0">
-              <a:schemeClr val="dk1"/>
-            </a:effectRef>
-            <a:fontRef idx="minor">
-              <a:schemeClr val="tx1"/>
-            </a:fontRef>
-          </p:style>
-        </p:cxnSp>
-        <p:cxnSp>
-          <p:nvCxnSpPr>
-            <p:cNvPr id="40" name="Straight Arrow Connector 39"/>
-            <p:cNvCxnSpPr>
-              <a:stCxn id="17" idx="4"/>
-              <a:endCxn id="18" idx="0"/>
-            </p:cNvCxnSpPr>
-            <p:nvPr/>
-          </p:nvCxnSpPr>
-          <p:spPr>
-            <a:xfrm rot="5400000">
-              <a:off x="3152176" y="7426539"/>
-              <a:ext cx="339334" cy="1588"/>
-            </a:xfrm>
-            <a:prstGeom prst="straightConnector1">
-              <a:avLst/>
-            </a:prstGeom>
-            <a:ln>
-              <a:tailEnd type="arrow"/>
-            </a:ln>
-          </p:spPr>
-          <p:style>
-            <a:lnRef idx="1">
-              <a:schemeClr val="dk1"/>
-            </a:lnRef>
-            <a:fillRef idx="0">
-              <a:schemeClr val="dk1"/>
-            </a:fillRef>
-            <a:effectRef idx="0">
-              <a:schemeClr val="dk1"/>
-            </a:effectRef>
-            <a:fontRef idx="minor">
-              <a:schemeClr val="tx1"/>
-            </a:fontRef>
-          </p:style>
-        </p:cxnSp>
-        <p:cxnSp>
-          <p:nvCxnSpPr>
-            <p:cNvPr id="48" name="Elbow Connector 47"/>
-            <p:cNvCxnSpPr>
-              <a:stCxn id="16" idx="3"/>
-              <a:endCxn id="12" idx="3"/>
-            </p:cNvCxnSpPr>
-            <p:nvPr/>
-          </p:nvCxnSpPr>
-          <p:spPr>
-            <a:xfrm flipV="1">
-              <a:off x="4714884" y="3292065"/>
-              <a:ext cx="1588" cy="2696783"/>
-            </a:xfrm>
-            <a:prstGeom prst="bentConnector3">
-              <a:avLst>
-                <a:gd name="adj1" fmla="val 14395466"/>
-              </a:avLst>
-            </a:prstGeom>
-            <a:ln>
-              <a:tailEnd type="arrow"/>
-            </a:ln>
-          </p:spPr>
-          <p:style>
-            <a:lnRef idx="1">
-              <a:schemeClr val="dk1"/>
-            </a:lnRef>
-            <a:fillRef idx="0">
-              <a:schemeClr val="dk1"/>
-            </a:fillRef>
-            <a:effectRef idx="0">
-              <a:schemeClr val="dk1"/>
-            </a:effectRef>
-            <a:fontRef idx="minor">
-              <a:schemeClr val="tx1"/>
-            </a:fontRef>
-          </p:style>
-        </p:cxnSp>
-        <p:sp>
-          <p:nvSpPr>
-            <p:cNvPr id="49" name="TextBox 48"/>
-            <p:cNvSpPr txBox="1"/>
-            <p:nvPr/>
-          </p:nvSpPr>
-          <p:spPr>
-            <a:xfrm>
-              <a:off x="3571876" y="6381760"/>
-              <a:ext cx="599972" cy="369332"/>
-            </a:xfrm>
-            <a:prstGeom prst="rect">
-              <a:avLst/>
-            </a:prstGeom>
-            <a:noFill/>
-          </p:spPr>
-          <p:txBody>
-            <a:bodyPr wrap="none" rtlCol="0">
-              <a:spAutoFit/>
-            </a:bodyPr>
-            <a:lstStyle/>
-            <a:p>
-              <a:r>
-                <a:rPr lang="en-IN" dirty="0" smtClean="0"/>
-                <a:t>True</a:t>
-              </a:r>
-              <a:endParaRPr lang="en-US" dirty="0"/>
-            </a:p>
-          </p:txBody>
-        </p:sp>
-        <p:sp>
-          <p:nvSpPr>
-            <p:cNvPr id="50" name="TextBox 49"/>
-            <p:cNvSpPr txBox="1"/>
-            <p:nvPr/>
-          </p:nvSpPr>
-          <p:spPr>
-            <a:xfrm>
-              <a:off x="5043606" y="4595810"/>
-              <a:ext cx="652936" cy="369332"/>
-            </a:xfrm>
-            <a:prstGeom prst="rect">
-              <a:avLst/>
-            </a:prstGeom>
-            <a:noFill/>
-          </p:spPr>
-          <p:txBody>
-            <a:bodyPr wrap="none" rtlCol="0">
-              <a:spAutoFit/>
-            </a:bodyPr>
-            <a:lstStyle/>
-            <a:p>
-              <a:r>
-                <a:rPr lang="en-IN" dirty="0" smtClean="0"/>
-                <a:t>False</a:t>
-              </a:r>
-              <a:endParaRPr lang="en-US" dirty="0"/>
-            </a:p>
-          </p:txBody>
-        </p:sp>
-      </p:grpSp>
+            <a:off x="2670176" y="523844"/>
+            <a:ext cx="1303334" cy="500066"/>
+          </a:xfrm>
+          <a:prstGeom prst="ellipse">
+            <a:avLst/>
+          </a:prstGeom>
+        </p:spPr>
+        <p:style>
+          <a:lnRef idx="2">
+            <a:schemeClr val="dk1"/>
+          </a:lnRef>
+          <a:fillRef idx="1">
+            <a:schemeClr val="lt1"/>
+          </a:fillRef>
+          <a:effectRef idx="0">
+            <a:schemeClr val="dk1"/>
+          </a:effectRef>
+          <a:fontRef idx="minor">
+            <a:schemeClr val="dk1"/>
+          </a:fontRef>
+        </p:style>
+        <p:txBody>
+          <a:bodyPr wrap="none" rtlCol="0" anchor="ctr"/>
+          <a:lstStyle/>
+          <a:p>
+            <a:pPr algn="ctr"/>
+            <a:r>
+              <a:rPr lang="en-IN" dirty="0" smtClean="0"/>
+              <a:t>start</a:t>
+            </a:r>
+            <a:endParaRPr lang="en-US" dirty="0"/>
+          </a:p>
+        </p:txBody>
+      </p:sp>
+      <p:sp>
+        <p:nvSpPr>
+          <p:cNvPr id="7" name="Flowchart: Data 6"/>
+          <p:cNvSpPr/>
+          <p:nvPr/>
+        </p:nvSpPr>
+        <p:spPr>
+          <a:xfrm>
+            <a:off x="2250273" y="1363240"/>
+            <a:ext cx="2143140" cy="500066"/>
+          </a:xfrm>
+          <a:prstGeom prst="flowChartInputOutput">
+            <a:avLst/>
+          </a:prstGeom>
+        </p:spPr>
+        <p:style>
+          <a:lnRef idx="2">
+            <a:schemeClr val="dk1"/>
+          </a:lnRef>
+          <a:fillRef idx="1">
+            <a:schemeClr val="lt1"/>
+          </a:fillRef>
+          <a:effectRef idx="0">
+            <a:schemeClr val="dk1"/>
+          </a:effectRef>
+          <a:fontRef idx="minor">
+            <a:schemeClr val="dk1"/>
+          </a:fontRef>
+        </p:style>
+        <p:txBody>
+          <a:bodyPr wrap="none" rtlCol="0" anchor="ctr"/>
+          <a:lstStyle/>
+          <a:p>
+            <a:pPr algn="ctr"/>
+            <a:r>
+              <a:rPr lang="en-IN" dirty="0" smtClean="0"/>
+              <a:t>read number </a:t>
+            </a:r>
+            <a:endParaRPr lang="en-US" dirty="0"/>
+          </a:p>
+        </p:txBody>
+      </p:sp>
+      <p:sp>
+        <p:nvSpPr>
+          <p:cNvPr id="9" name="Rectangle 8"/>
+          <p:cNvSpPr/>
+          <p:nvPr/>
+        </p:nvSpPr>
+        <p:spPr>
+          <a:xfrm>
+            <a:off x="2250273" y="2202636"/>
+            <a:ext cx="2143140" cy="500066"/>
+          </a:xfrm>
+          <a:prstGeom prst="rect">
+            <a:avLst/>
+          </a:prstGeom>
+        </p:spPr>
+        <p:style>
+          <a:lnRef idx="2">
+            <a:schemeClr val="dk1"/>
+          </a:lnRef>
+          <a:fillRef idx="1">
+            <a:schemeClr val="lt1"/>
+          </a:fillRef>
+          <a:effectRef idx="0">
+            <a:schemeClr val="dk1"/>
+          </a:effectRef>
+          <a:fontRef idx="minor">
+            <a:schemeClr val="dk1"/>
+          </a:fontRef>
+        </p:style>
+        <p:txBody>
+          <a:bodyPr wrap="none" rtlCol="0" anchor="ctr"/>
+          <a:lstStyle/>
+          <a:p>
+            <a:pPr algn="ctr"/>
+            <a:r>
+              <a:rPr lang="en-IN" dirty="0" smtClean="0"/>
+              <a:t>guess  = 1 </a:t>
+            </a:r>
+            <a:endParaRPr lang="en-US" dirty="0"/>
+          </a:p>
+        </p:txBody>
+      </p:sp>
+      <p:sp>
+        <p:nvSpPr>
+          <p:cNvPr id="12" name="Rectangle 11"/>
+          <p:cNvSpPr/>
+          <p:nvPr/>
+        </p:nvSpPr>
+        <p:spPr>
+          <a:xfrm>
+            <a:off x="1928802" y="3042032"/>
+            <a:ext cx="2786082" cy="500066"/>
+          </a:xfrm>
+          <a:prstGeom prst="rect">
+            <a:avLst/>
+          </a:prstGeom>
+        </p:spPr>
+        <p:style>
+          <a:lnRef idx="2">
+            <a:schemeClr val="dk1"/>
+          </a:lnRef>
+          <a:fillRef idx="1">
+            <a:schemeClr val="lt1"/>
+          </a:fillRef>
+          <a:effectRef idx="0">
+            <a:schemeClr val="dk1"/>
+          </a:effectRef>
+          <a:fontRef idx="minor">
+            <a:schemeClr val="dk1"/>
+          </a:fontRef>
+        </p:style>
+        <p:txBody>
+          <a:bodyPr wrap="none" rtlCol="0" anchor="ctr"/>
+          <a:lstStyle/>
+          <a:p>
+            <a:pPr algn="ctr"/>
+            <a:r>
+              <a:rPr lang="en-IN" dirty="0" err="1" smtClean="0"/>
+              <a:t>fx</a:t>
+            </a:r>
+            <a:r>
+              <a:rPr lang="en-IN" dirty="0" smtClean="0"/>
+              <a:t> = guess * guess - number</a:t>
+            </a:r>
+            <a:endParaRPr lang="en-US" dirty="0"/>
+          </a:p>
+        </p:txBody>
+      </p:sp>
+      <p:sp>
+        <p:nvSpPr>
+          <p:cNvPr id="13" name="Rectangle 12"/>
+          <p:cNvSpPr/>
+          <p:nvPr/>
+        </p:nvSpPr>
+        <p:spPr>
+          <a:xfrm>
+            <a:off x="2428868" y="3881428"/>
+            <a:ext cx="1785950" cy="500066"/>
+          </a:xfrm>
+          <a:prstGeom prst="rect">
+            <a:avLst/>
+          </a:prstGeom>
+        </p:spPr>
+        <p:style>
+          <a:lnRef idx="2">
+            <a:schemeClr val="dk1"/>
+          </a:lnRef>
+          <a:fillRef idx="1">
+            <a:schemeClr val="lt1"/>
+          </a:fillRef>
+          <a:effectRef idx="0">
+            <a:schemeClr val="dk1"/>
+          </a:effectRef>
+          <a:fontRef idx="minor">
+            <a:schemeClr val="dk1"/>
+          </a:fontRef>
+        </p:style>
+        <p:txBody>
+          <a:bodyPr wrap="none" rtlCol="0" anchor="ctr"/>
+          <a:lstStyle/>
+          <a:p>
+            <a:pPr algn="ctr"/>
+            <a:r>
+              <a:rPr lang="en-IN" dirty="0" err="1" smtClean="0"/>
+              <a:t>dx</a:t>
+            </a:r>
+            <a:r>
+              <a:rPr lang="en-IN" dirty="0" smtClean="0"/>
+              <a:t> = 2 * guess</a:t>
+            </a:r>
+            <a:endParaRPr lang="en-US" dirty="0"/>
+          </a:p>
+        </p:txBody>
+      </p:sp>
+      <p:sp>
+        <p:nvSpPr>
+          <p:cNvPr id="15" name="Rectangle 14"/>
+          <p:cNvSpPr/>
+          <p:nvPr/>
+        </p:nvSpPr>
+        <p:spPr>
+          <a:xfrm>
+            <a:off x="1928802" y="4720824"/>
+            <a:ext cx="2786082" cy="500066"/>
+          </a:xfrm>
+          <a:prstGeom prst="rect">
+            <a:avLst/>
+          </a:prstGeom>
+        </p:spPr>
+        <p:style>
+          <a:lnRef idx="2">
+            <a:schemeClr val="dk1"/>
+          </a:lnRef>
+          <a:fillRef idx="1">
+            <a:schemeClr val="lt1"/>
+          </a:fillRef>
+          <a:effectRef idx="0">
+            <a:schemeClr val="dk1"/>
+          </a:effectRef>
+          <a:fontRef idx="minor">
+            <a:schemeClr val="dk1"/>
+          </a:fontRef>
+        </p:style>
+        <p:txBody>
+          <a:bodyPr wrap="none" rtlCol="0" anchor="ctr"/>
+          <a:lstStyle/>
+          <a:p>
+            <a:pPr algn="ctr"/>
+            <a:r>
+              <a:rPr lang="en-IN" dirty="0" smtClean="0"/>
+              <a:t>actual = guess – ( </a:t>
+            </a:r>
+            <a:r>
+              <a:rPr lang="en-IN" dirty="0" err="1" smtClean="0"/>
+              <a:t>fx</a:t>
+            </a:r>
+            <a:r>
+              <a:rPr lang="en-IN" dirty="0" smtClean="0"/>
+              <a:t> / </a:t>
+            </a:r>
+            <a:r>
+              <a:rPr lang="en-IN" dirty="0" err="1" smtClean="0"/>
+              <a:t>dx</a:t>
+            </a:r>
+            <a:r>
+              <a:rPr lang="en-IN" dirty="0" smtClean="0"/>
+              <a:t> )</a:t>
+            </a:r>
+            <a:endParaRPr lang="en-US" dirty="0"/>
+          </a:p>
+        </p:txBody>
+      </p:sp>
+      <p:sp>
+        <p:nvSpPr>
+          <p:cNvPr id="16" name="Flowchart: Decision 15"/>
+          <p:cNvSpPr/>
+          <p:nvPr/>
+        </p:nvSpPr>
+        <p:spPr>
+          <a:xfrm>
+            <a:off x="1928802" y="5560220"/>
+            <a:ext cx="2786082" cy="857256"/>
+          </a:xfrm>
+          <a:prstGeom prst="flowChartDecision">
+            <a:avLst/>
+          </a:prstGeom>
+        </p:spPr>
+        <p:style>
+          <a:lnRef idx="2">
+            <a:schemeClr val="dk1"/>
+          </a:lnRef>
+          <a:fillRef idx="1">
+            <a:schemeClr val="lt1"/>
+          </a:fillRef>
+          <a:effectRef idx="0">
+            <a:schemeClr val="dk1"/>
+          </a:effectRef>
+          <a:fontRef idx="minor">
+            <a:schemeClr val="dk1"/>
+          </a:fontRef>
+        </p:style>
+        <p:txBody>
+          <a:bodyPr wrap="none" rtlCol="0" anchor="ctr"/>
+          <a:lstStyle/>
+          <a:p>
+            <a:pPr algn="ctr"/>
+            <a:r>
+              <a:rPr lang="en-IN" dirty="0" smtClean="0"/>
+              <a:t>actual = guess ?</a:t>
+            </a:r>
+            <a:endParaRPr lang="en-US" dirty="0"/>
+          </a:p>
+        </p:txBody>
+      </p:sp>
+      <p:sp>
+        <p:nvSpPr>
+          <p:cNvPr id="17" name="Flowchart: Data 16"/>
+          <p:cNvSpPr/>
+          <p:nvPr/>
+        </p:nvSpPr>
+        <p:spPr>
+          <a:xfrm>
+            <a:off x="1928802" y="6756806"/>
+            <a:ext cx="2786082" cy="500066"/>
+          </a:xfrm>
+          <a:prstGeom prst="flowChartInputOutput">
+            <a:avLst/>
+          </a:prstGeom>
+        </p:spPr>
+        <p:style>
+          <a:lnRef idx="2">
+            <a:schemeClr val="dk1"/>
+          </a:lnRef>
+          <a:fillRef idx="1">
+            <a:schemeClr val="lt1"/>
+          </a:fillRef>
+          <a:effectRef idx="0">
+            <a:schemeClr val="dk1"/>
+          </a:effectRef>
+          <a:fontRef idx="minor">
+            <a:schemeClr val="dk1"/>
+          </a:fontRef>
+        </p:style>
+        <p:txBody>
+          <a:bodyPr wrap="none" rtlCol="0" anchor="ctr"/>
+          <a:lstStyle/>
+          <a:p>
+            <a:pPr algn="ctr"/>
+            <a:r>
+              <a:rPr lang="en-IN" dirty="0" smtClean="0"/>
+              <a:t>print root is actual</a:t>
+            </a:r>
+            <a:endParaRPr lang="en-US" dirty="0"/>
+          </a:p>
+        </p:txBody>
+      </p:sp>
+      <p:sp>
+        <p:nvSpPr>
+          <p:cNvPr id="18" name="Oval 17"/>
+          <p:cNvSpPr/>
+          <p:nvPr/>
+        </p:nvSpPr>
+        <p:spPr>
+          <a:xfrm>
+            <a:off x="2670176" y="7596206"/>
+            <a:ext cx="1303334" cy="500066"/>
+          </a:xfrm>
+          <a:prstGeom prst="ellipse">
+            <a:avLst/>
+          </a:prstGeom>
+        </p:spPr>
+        <p:style>
+          <a:lnRef idx="2">
+            <a:schemeClr val="dk1"/>
+          </a:lnRef>
+          <a:fillRef idx="1">
+            <a:schemeClr val="lt1"/>
+          </a:fillRef>
+          <a:effectRef idx="0">
+            <a:schemeClr val="dk1"/>
+          </a:effectRef>
+          <a:fontRef idx="minor">
+            <a:schemeClr val="dk1"/>
+          </a:fontRef>
+        </p:style>
+        <p:txBody>
+          <a:bodyPr wrap="none" rtlCol="0" anchor="ctr"/>
+          <a:lstStyle/>
+          <a:p>
+            <a:pPr algn="ctr"/>
+            <a:r>
+              <a:rPr lang="en-IN" dirty="0" smtClean="0"/>
+              <a:t>stop</a:t>
+            </a:r>
+            <a:endParaRPr lang="en-US" dirty="0"/>
+          </a:p>
+        </p:txBody>
+      </p:sp>
+      <p:cxnSp>
+        <p:nvCxnSpPr>
+          <p:cNvPr id="20" name="Straight Arrow Connector 19"/>
+          <p:cNvCxnSpPr/>
+          <p:nvPr/>
+        </p:nvCxnSpPr>
+        <p:spPr>
+          <a:xfrm rot="5400000">
+            <a:off x="3178967" y="1192781"/>
+            <a:ext cx="285752" cy="1588"/>
+          </a:xfrm>
+          <a:prstGeom prst="straightConnector1">
+            <a:avLst/>
+          </a:prstGeom>
+          <a:ln>
+            <a:tailEnd type="arrow"/>
+          </a:ln>
+        </p:spPr>
+        <p:style>
+          <a:lnRef idx="1">
+            <a:schemeClr val="dk1"/>
+          </a:lnRef>
+          <a:fillRef idx="0">
+            <a:schemeClr val="dk1"/>
+          </a:fillRef>
+          <a:effectRef idx="0">
+            <a:schemeClr val="dk1"/>
+          </a:effectRef>
+          <a:fontRef idx="minor">
+            <a:schemeClr val="tx1"/>
+          </a:fontRef>
+        </p:style>
+      </p:cxnSp>
+      <p:cxnSp>
+        <p:nvCxnSpPr>
+          <p:cNvPr id="22" name="Straight Arrow Connector 21"/>
+          <p:cNvCxnSpPr/>
+          <p:nvPr/>
+        </p:nvCxnSpPr>
+        <p:spPr>
+          <a:xfrm rot="5400000">
+            <a:off x="3178967" y="2032177"/>
+            <a:ext cx="285752" cy="1588"/>
+          </a:xfrm>
+          <a:prstGeom prst="straightConnector1">
+            <a:avLst/>
+          </a:prstGeom>
+          <a:ln>
+            <a:tailEnd type="arrow"/>
+          </a:ln>
+        </p:spPr>
+        <p:style>
+          <a:lnRef idx="1">
+            <a:schemeClr val="dk1"/>
+          </a:lnRef>
+          <a:fillRef idx="0">
+            <a:schemeClr val="dk1"/>
+          </a:fillRef>
+          <a:effectRef idx="0">
+            <a:schemeClr val="dk1"/>
+          </a:effectRef>
+          <a:fontRef idx="minor">
+            <a:schemeClr val="tx1"/>
+          </a:fontRef>
+        </p:style>
+      </p:cxnSp>
+      <p:cxnSp>
+        <p:nvCxnSpPr>
+          <p:cNvPr id="25" name="Straight Arrow Connector 24"/>
+          <p:cNvCxnSpPr/>
+          <p:nvPr/>
+        </p:nvCxnSpPr>
+        <p:spPr>
+          <a:xfrm rot="5400000">
+            <a:off x="3143248" y="2871573"/>
+            <a:ext cx="357190" cy="1588"/>
+          </a:xfrm>
+          <a:prstGeom prst="straightConnector1">
+            <a:avLst/>
+          </a:prstGeom>
+          <a:ln>
+            <a:tailEnd type="arrow"/>
+          </a:ln>
+        </p:spPr>
+        <p:style>
+          <a:lnRef idx="1">
+            <a:schemeClr val="dk1"/>
+          </a:lnRef>
+          <a:fillRef idx="0">
+            <a:schemeClr val="dk1"/>
+          </a:fillRef>
+          <a:effectRef idx="0">
+            <a:schemeClr val="dk1"/>
+          </a:effectRef>
+          <a:fontRef idx="minor">
+            <a:schemeClr val="tx1"/>
+          </a:fontRef>
+        </p:style>
+      </p:cxnSp>
+      <p:cxnSp>
+        <p:nvCxnSpPr>
+          <p:cNvPr id="28" name="Straight Arrow Connector 27"/>
+          <p:cNvCxnSpPr/>
+          <p:nvPr/>
+        </p:nvCxnSpPr>
+        <p:spPr>
+          <a:xfrm rot="5400000">
+            <a:off x="3143248" y="3710969"/>
+            <a:ext cx="357190" cy="1588"/>
+          </a:xfrm>
+          <a:prstGeom prst="straightConnector1">
+            <a:avLst/>
+          </a:prstGeom>
+          <a:ln>
+            <a:tailEnd type="arrow"/>
+          </a:ln>
+        </p:spPr>
+        <p:style>
+          <a:lnRef idx="1">
+            <a:schemeClr val="dk1"/>
+          </a:lnRef>
+          <a:fillRef idx="0">
+            <a:schemeClr val="dk1"/>
+          </a:fillRef>
+          <a:effectRef idx="0">
+            <a:schemeClr val="dk1"/>
+          </a:effectRef>
+          <a:fontRef idx="minor">
+            <a:schemeClr val="tx1"/>
+          </a:fontRef>
+        </p:style>
+      </p:cxnSp>
+      <p:cxnSp>
+        <p:nvCxnSpPr>
+          <p:cNvPr id="31" name="Straight Arrow Connector 30"/>
+          <p:cNvCxnSpPr/>
+          <p:nvPr/>
+        </p:nvCxnSpPr>
+        <p:spPr>
+          <a:xfrm rot="5400000">
+            <a:off x="3143248" y="4550365"/>
+            <a:ext cx="357190" cy="1588"/>
+          </a:xfrm>
+          <a:prstGeom prst="straightConnector1">
+            <a:avLst/>
+          </a:prstGeom>
+          <a:ln>
+            <a:tailEnd type="arrow"/>
+          </a:ln>
+        </p:spPr>
+        <p:style>
+          <a:lnRef idx="1">
+            <a:schemeClr val="dk1"/>
+          </a:lnRef>
+          <a:fillRef idx="0">
+            <a:schemeClr val="dk1"/>
+          </a:fillRef>
+          <a:effectRef idx="0">
+            <a:schemeClr val="dk1"/>
+          </a:effectRef>
+          <a:fontRef idx="minor">
+            <a:schemeClr val="tx1"/>
+          </a:fontRef>
+        </p:style>
+      </p:cxnSp>
+      <p:cxnSp>
+        <p:nvCxnSpPr>
+          <p:cNvPr id="34" name="Straight Arrow Connector 33"/>
+          <p:cNvCxnSpPr/>
+          <p:nvPr/>
+        </p:nvCxnSpPr>
+        <p:spPr>
+          <a:xfrm rot="5400000">
+            <a:off x="3143248" y="5389761"/>
+            <a:ext cx="357190" cy="1588"/>
+          </a:xfrm>
+          <a:prstGeom prst="straightConnector1">
+            <a:avLst/>
+          </a:prstGeom>
+          <a:ln>
+            <a:tailEnd type="arrow"/>
+          </a:ln>
+        </p:spPr>
+        <p:style>
+          <a:lnRef idx="1">
+            <a:schemeClr val="dk1"/>
+          </a:lnRef>
+          <a:fillRef idx="0">
+            <a:schemeClr val="dk1"/>
+          </a:fillRef>
+          <a:effectRef idx="0">
+            <a:schemeClr val="dk1"/>
+          </a:effectRef>
+          <a:fontRef idx="minor">
+            <a:schemeClr val="tx1"/>
+          </a:fontRef>
+        </p:style>
+      </p:cxnSp>
+      <p:cxnSp>
+        <p:nvCxnSpPr>
+          <p:cNvPr id="37" name="Straight Arrow Connector 36"/>
+          <p:cNvCxnSpPr/>
+          <p:nvPr/>
+        </p:nvCxnSpPr>
+        <p:spPr>
+          <a:xfrm rot="5400000">
+            <a:off x="3178967" y="6586347"/>
+            <a:ext cx="285752" cy="1588"/>
+          </a:xfrm>
+          <a:prstGeom prst="straightConnector1">
+            <a:avLst/>
+          </a:prstGeom>
+          <a:ln>
+            <a:tailEnd type="arrow"/>
+          </a:ln>
+        </p:spPr>
+        <p:style>
+          <a:lnRef idx="1">
+            <a:schemeClr val="dk1"/>
+          </a:lnRef>
+          <a:fillRef idx="0">
+            <a:schemeClr val="dk1"/>
+          </a:fillRef>
+          <a:effectRef idx="0">
+            <a:schemeClr val="dk1"/>
+          </a:effectRef>
+          <a:fontRef idx="minor">
+            <a:schemeClr val="tx1"/>
+          </a:fontRef>
+        </p:style>
+      </p:cxnSp>
+      <p:cxnSp>
+        <p:nvCxnSpPr>
+          <p:cNvPr id="40" name="Straight Arrow Connector 39"/>
+          <p:cNvCxnSpPr>
+            <a:stCxn id="17" idx="4"/>
+            <a:endCxn id="18" idx="0"/>
+          </p:cNvCxnSpPr>
+          <p:nvPr/>
+        </p:nvCxnSpPr>
+        <p:spPr>
+          <a:xfrm rot="5400000">
+            <a:off x="3152176" y="7426539"/>
+            <a:ext cx="339334" cy="1588"/>
+          </a:xfrm>
+          <a:prstGeom prst="straightConnector1">
+            <a:avLst/>
+          </a:prstGeom>
+          <a:ln>
+            <a:tailEnd type="arrow"/>
+          </a:ln>
+        </p:spPr>
+        <p:style>
+          <a:lnRef idx="1">
+            <a:schemeClr val="dk1"/>
+          </a:lnRef>
+          <a:fillRef idx="0">
+            <a:schemeClr val="dk1"/>
+          </a:fillRef>
+          <a:effectRef idx="0">
+            <a:schemeClr val="dk1"/>
+          </a:effectRef>
+          <a:fontRef idx="minor">
+            <a:schemeClr val="tx1"/>
+          </a:fontRef>
+        </p:style>
+      </p:cxnSp>
+      <p:cxnSp>
+        <p:nvCxnSpPr>
+          <p:cNvPr id="48" name="Elbow Connector 47"/>
+          <p:cNvCxnSpPr>
+            <a:stCxn id="16" idx="3"/>
+            <a:endCxn id="26" idx="2"/>
+          </p:cNvCxnSpPr>
+          <p:nvPr/>
+        </p:nvCxnSpPr>
+        <p:spPr>
+          <a:xfrm flipV="1">
+            <a:off x="4714884" y="4524372"/>
+            <a:ext cx="964413" cy="1464476"/>
+          </a:xfrm>
+          <a:prstGeom prst="bentConnector2">
+            <a:avLst/>
+          </a:prstGeom>
+          <a:ln>
+            <a:tailEnd type="arrow"/>
+          </a:ln>
+        </p:spPr>
+        <p:style>
+          <a:lnRef idx="1">
+            <a:schemeClr val="dk1"/>
+          </a:lnRef>
+          <a:fillRef idx="0">
+            <a:schemeClr val="dk1"/>
+          </a:fillRef>
+          <a:effectRef idx="0">
+            <a:schemeClr val="dk1"/>
+          </a:effectRef>
+          <a:fontRef idx="minor">
+            <a:schemeClr val="tx1"/>
+          </a:fontRef>
+        </p:style>
+      </p:cxnSp>
+      <p:sp>
+        <p:nvSpPr>
+          <p:cNvPr id="49" name="TextBox 48"/>
+          <p:cNvSpPr txBox="1"/>
+          <p:nvPr/>
+        </p:nvSpPr>
+        <p:spPr>
+          <a:xfrm>
+            <a:off x="3571876" y="6381760"/>
+            <a:ext cx="599972" cy="369332"/>
+          </a:xfrm>
+          <a:prstGeom prst="rect">
+            <a:avLst/>
+          </a:prstGeom>
+          <a:noFill/>
+        </p:spPr>
+        <p:txBody>
+          <a:bodyPr wrap="none" rtlCol="0">
+            <a:spAutoFit/>
+          </a:bodyPr>
+          <a:lstStyle/>
+          <a:p>
+            <a:r>
+              <a:rPr lang="en-IN" dirty="0" smtClean="0"/>
+              <a:t>True</a:t>
+            </a:r>
+            <a:endParaRPr lang="en-US" dirty="0"/>
+          </a:p>
+        </p:txBody>
+      </p:sp>
+      <p:sp>
+        <p:nvSpPr>
+          <p:cNvPr id="50" name="TextBox 49"/>
+          <p:cNvSpPr txBox="1"/>
+          <p:nvPr/>
+        </p:nvSpPr>
+        <p:spPr>
+          <a:xfrm>
+            <a:off x="4857760" y="5524504"/>
+            <a:ext cx="652936" cy="369332"/>
+          </a:xfrm>
+          <a:prstGeom prst="rect">
+            <a:avLst/>
+          </a:prstGeom>
+          <a:noFill/>
+        </p:spPr>
+        <p:txBody>
+          <a:bodyPr wrap="none" rtlCol="0">
+            <a:spAutoFit/>
+          </a:bodyPr>
+          <a:lstStyle/>
+          <a:p>
+            <a:r>
+              <a:rPr lang="en-IN" dirty="0" smtClean="0"/>
+              <a:t>False</a:t>
+            </a:r>
+            <a:endParaRPr lang="en-US" dirty="0"/>
+          </a:p>
+        </p:txBody>
+      </p:sp>
       <p:sp>
         <p:nvSpPr>
           <p:cNvPr id="23" name="Rectangle 22"/>
@@ -12428,6 +12395,88 @@
           </a:p>
         </p:txBody>
       </p:sp>
+      <p:sp>
+        <p:nvSpPr>
+          <p:cNvPr id="26" name="Rectangle 25"/>
+          <p:cNvSpPr/>
+          <p:nvPr/>
+        </p:nvSpPr>
+        <p:spPr>
+          <a:xfrm>
+            <a:off x="4786322" y="4024306"/>
+            <a:ext cx="1785950" cy="500066"/>
+          </a:xfrm>
+          <a:prstGeom prst="rect">
+            <a:avLst/>
+          </a:prstGeom>
+        </p:spPr>
+        <p:style>
+          <a:lnRef idx="2">
+            <a:schemeClr val="dk1"/>
+          </a:lnRef>
+          <a:fillRef idx="1">
+            <a:schemeClr val="lt1"/>
+          </a:fillRef>
+          <a:effectRef idx="0">
+            <a:schemeClr val="dk1"/>
+          </a:effectRef>
+          <a:fontRef idx="minor">
+            <a:schemeClr val="dk1"/>
+          </a:fontRef>
+        </p:style>
+        <p:txBody>
+          <a:bodyPr wrap="none" rtlCol="0" anchor="ctr"/>
+          <a:lstStyle/>
+          <a:p>
+            <a:pPr algn="ctr"/>
+            <a:r>
+              <a:rPr lang="en-IN" dirty="0" smtClean="0"/>
+              <a:t>g</a:t>
+            </a:r>
+            <a:r>
+              <a:rPr lang="en-IN" dirty="0" smtClean="0"/>
+              <a:t>uess = actual</a:t>
+            </a:r>
+            <a:endParaRPr lang="en-US" dirty="0"/>
+          </a:p>
+        </p:txBody>
+      </p:sp>
+      <p:cxnSp>
+        <p:nvCxnSpPr>
+          <p:cNvPr id="29" name="Elbow Connector 47"/>
+          <p:cNvCxnSpPr>
+            <a:stCxn id="26" idx="0"/>
+            <a:endCxn id="12" idx="3"/>
+          </p:cNvCxnSpPr>
+          <p:nvPr/>
+        </p:nvCxnSpPr>
+        <p:spPr>
+          <a:xfrm rot="16200000" flipV="1">
+            <a:off x="4830971" y="3175979"/>
+            <a:ext cx="732241" cy="964413"/>
+          </a:xfrm>
+          <a:prstGeom prst="bentConnector2">
+            <a:avLst/>
+          </a:prstGeom>
+          <a:ln>
+            <a:tailEnd type="arrow"/>
+          </a:ln>
+        </p:spPr>
+        <p:style>
+          <a:lnRef idx="1">
+            <a:schemeClr val="dk1"/>
+          </a:lnRef>
+          <a:fillRef idx="0">
+            <a:schemeClr val="dk1"/>
+          </a:fillRef>
+          <a:effectRef idx="0">
+            <a:schemeClr val="dk1"/>
+          </a:effectRef>
+          <a:fontRef idx="minor">
+            <a:schemeClr val="tx1"/>
+          </a:fontRef>
+        </p:style>
+      </p:cxnSp>
     </p:spTree>
   </p:cSld>
   <p:clrMapOvr>

</xml_diff>